<commit_message>
update all lectures to list module 0 in overview, remove use of comic sans font in the cloud lecture
</commit_message>
<xml_diff>
--- a/lectures/cshl/2014/RNASeq_Module1_Lecture.pptx
+++ b/lectures/cshl/2014/RNASeq_Module1_Lecture.pptx
@@ -7031,42 +7031,50 @@
           <a:lstStyle/>
           <a:p>
             <a:r>
-              <a:rPr lang="en-US" sz="1800">
+              <a:rPr lang="en-US" altLang="ja-JP" sz="1600" dirty="0">
                 <a:latin typeface="Calibri" charset="0"/>
                 <a:ea typeface="ＭＳ Ｐゴシック" charset="0"/>
                 <a:hlinkClick r:id="rId2"/>
               </a:rPr>
-              <a:t>http://www.alexaplatform.org/courses/2013/cbw/Agilent_Trace_Examples.pdf</a:t>
-            </a:r>
-            <a:endParaRPr lang="en-US" sz="1800">
+              <a:t>https://github.com/griffithlab/rnaseq_tutorial/wiki/Resources/</a:t>
+            </a:r>
+            <a:r>
+              <a:rPr lang="en-US" altLang="ja-JP" sz="1600" dirty="0" smtClean="0">
+                <a:latin typeface="Calibri" charset="0"/>
+                <a:ea typeface="ＭＳ Ｐゴシック" charset="0"/>
+                <a:hlinkClick r:id="rId2"/>
+              </a:rPr>
+              <a:t>Agilent_Trace_Examples.pdf</a:t>
+            </a:r>
+            <a:endParaRPr lang="en-US" altLang="ja-JP" sz="1600" dirty="0" smtClean="0">
               <a:latin typeface="Calibri" charset="0"/>
               <a:ea typeface="ＭＳ Ｐゴシック" charset="0"/>
             </a:endParaRPr>
           </a:p>
           <a:p>
             <a:r>
-              <a:rPr lang="ja-JP" altLang="en-US" sz="2400">
+              <a:rPr lang="ja-JP" altLang="en-US" sz="2400" dirty="0" smtClean="0">
                 <a:latin typeface="Calibri" charset="0"/>
                 <a:ea typeface="ＭＳ Ｐゴシック" charset="0"/>
               </a:rPr>
               <a:t>‘</a:t>
             </a:r>
             <a:r>
-              <a:rPr lang="en-US" altLang="ja-JP" sz="2400">
+              <a:rPr lang="en-US" altLang="ja-JP" sz="2400" dirty="0">
                 <a:latin typeface="Calibri" charset="0"/>
                 <a:ea typeface="ＭＳ Ｐゴシック" charset="0"/>
               </a:rPr>
               <a:t>RIN</a:t>
             </a:r>
             <a:r>
-              <a:rPr lang="ja-JP" altLang="en-US" sz="2400">
+              <a:rPr lang="ja-JP" altLang="en-US" sz="2400" dirty="0">
                 <a:latin typeface="Calibri" charset="0"/>
                 <a:ea typeface="ＭＳ Ｐゴシック" charset="0"/>
               </a:rPr>
               <a:t>’</a:t>
             </a:r>
             <a:r>
-              <a:rPr lang="en-US" altLang="ja-JP" sz="2400">
+              <a:rPr lang="en-US" altLang="ja-JP" sz="2400" dirty="0">
                 <a:latin typeface="Calibri" charset="0"/>
                 <a:ea typeface="ＭＳ Ｐゴシック" charset="0"/>
               </a:rPr>
@@ -7076,7 +7084,7 @@
           <a:p>
             <a:pPr lvl="1"/>
             <a:r>
-              <a:rPr lang="en-US" sz="2000">
+              <a:rPr lang="en-US" sz="2000" dirty="0">
                 <a:latin typeface="Calibri" charset="0"/>
                 <a:ea typeface="ＭＳ Ｐゴシック" charset="0"/>
               </a:rPr>
@@ -7084,7 +7092,7 @@
             </a:r>
           </a:p>
           <a:p>
-            <a:endParaRPr lang="en-US">
+            <a:endParaRPr lang="en-US" dirty="0">
               <a:latin typeface="Calibri" charset="0"/>
               <a:ea typeface="ＭＳ Ｐゴシック" charset="0"/>
             </a:endParaRPr>
@@ -7672,15 +7680,15 @@
               <a:defRPr/>
             </a:pPr>
             <a:r>
-              <a:rPr lang="en-US" sz="1600" dirty="0">
+              <a:rPr lang="en-US" sz="1500" dirty="0">
                 <a:latin typeface="Calibri" charset="0"/>
                 <a:ea typeface="ＭＳ Ｐゴシック" charset="0"/>
                 <a:hlinkClick r:id="rId2"/>
               </a:rPr>
-              <a:t>http://www.alexaplatform.org/courses/2013/cbw</a:t>
-            </a:r>
-            <a:r>
-              <a:rPr lang="en-US" sz="1600" dirty="0" smtClean="0">
+              <a:t>https://github.com/griffithlab/rnaseq_tutorial/wiki/Resources</a:t>
+            </a:r>
+            <a:r>
+              <a:rPr lang="en-US" sz="1500" dirty="0" smtClean="0">
                 <a:latin typeface="Calibri" charset="0"/>
                 <a:ea typeface="ＭＳ Ｐゴシック" charset="0"/>
                 <a:hlinkClick r:id="rId2"/>
@@ -7688,7 +7696,7 @@
               <a:t>/</a:t>
             </a:r>
             <a:r>
-              <a:rPr lang="en-US" sz="1600" dirty="0">
+              <a:rPr lang="en-US" sz="1500" dirty="0">
                 <a:latin typeface="Calibri" charset="0"/>
                 <a:ea typeface="ＭＳ Ｐゴシック" charset="0"/>
                 <a:hlinkClick r:id="rId2"/>
@@ -7696,25 +7704,14 @@
               <a:t>ENCODE_RNAseq_standards_v1.0.</a:t>
             </a:r>
             <a:r>
-              <a:rPr lang="en-US" sz="1600" dirty="0" smtClean="0">
+              <a:rPr lang="en-US" sz="1500" dirty="0" smtClean="0">
                 <a:latin typeface="Calibri" charset="0"/>
                 <a:ea typeface="ＭＳ Ｐゴシック" charset="0"/>
                 <a:hlinkClick r:id="rId2"/>
               </a:rPr>
               <a:t>pdf</a:t>
             </a:r>
-            <a:endParaRPr lang="en-US" sz="1600" dirty="0" smtClean="0">
-              <a:latin typeface="Calibri" charset="0"/>
-              <a:ea typeface="ＭＳ Ｐゴシック" charset="0"/>
-            </a:endParaRPr>
-          </a:p>
-          <a:p>
-            <a:pPr marL="0" indent="0">
-              <a:buFont typeface="Arial" charset="0"/>
-              <a:buNone/>
-              <a:defRPr/>
-            </a:pPr>
-            <a:endParaRPr lang="en-US" sz="1600" dirty="0">
+            <a:endParaRPr lang="en-US" sz="1500" dirty="0" smtClean="0">
               <a:latin typeface="Calibri" charset="0"/>
               <a:ea typeface="ＭＳ Ｐゴシック" charset="0"/>
             </a:endParaRPr>
@@ -10106,31 +10103,7 @@
                 <a:ea typeface="+mj-ea"/>
                 <a:cs typeface="Calibri"/>
               </a:rPr>
-              <a:t>Malachi Griffith, Obi </a:t>
-            </a:r>
-            <a:r>
-              <a:rPr lang="en-US" sz="1600" dirty="0" smtClean="0">
-                <a:latin typeface="Calibri"/>
-                <a:ea typeface="+mj-ea"/>
-                <a:cs typeface="Calibri"/>
-              </a:rPr>
-              <a:t>Griffith, </a:t>
-            </a:r>
-            <a:r>
-              <a:rPr lang="en-US" sz="1600" dirty="0" smtClean="0">
-                <a:latin typeface="Calibri"/>
-                <a:ea typeface="+mj-ea"/>
-                <a:cs typeface="Calibri"/>
-              </a:rPr>
-              <a:t>Jason </a:t>
-            </a:r>
-            <a:r>
-              <a:rPr lang="en-US" sz="1600" dirty="0" smtClean="0">
-                <a:latin typeface="Calibri"/>
-                <a:ea typeface="+mj-ea"/>
-                <a:cs typeface="Calibri"/>
-              </a:rPr>
-              <a:t>Walker, Ben </a:t>
+              <a:t>Malachi Griffith, Obi Griffith, Jason Walker, Ben </a:t>
             </a:r>
             <a:r>
               <a:rPr lang="en-US" sz="1600" dirty="0" err="1" smtClean="0">
@@ -10190,35 +10163,8 @@
                 <a:ea typeface="+mn-ea"/>
                 <a:cs typeface="Calibri"/>
               </a:rPr>
-              <a:t>November </a:t>
-            </a:r>
-            <a:r>
-              <a:rPr lang="en-US" sz="1400" dirty="0" smtClean="0">
-                <a:ln w="1270">
-                  <a:solidFill>
-                    <a:schemeClr val="tx1">
-                      <a:alpha val="38000"/>
-                    </a:schemeClr>
-                  </a:solidFill>
-                </a:ln>
-                <a:latin typeface="Calibri"/>
-                <a:ea typeface="+mn-ea"/>
-                <a:cs typeface="Calibri"/>
-              </a:rPr>
-              <a:t>11-23, 2014</a:t>
-            </a:r>
-            <a:endParaRPr lang="en-US" sz="1400" dirty="0" smtClean="0">
-              <a:ln w="1270">
-                <a:solidFill>
-                  <a:schemeClr val="tx1">
-                    <a:alpha val="38000"/>
-                  </a:schemeClr>
-                </a:solidFill>
-              </a:ln>
-              <a:latin typeface="Calibri"/>
-              <a:ea typeface="+mn-ea"/>
-              <a:cs typeface="Calibri"/>
-            </a:endParaRPr>
+              <a:t>November 11-23, 2014</a:t>
+            </a:r>
           </a:p>
         </p:txBody>
       </p:sp>
@@ -17687,7 +17633,7 @@
         <p:spPr/>
         <p:txBody>
           <a:bodyPr>
-            <a:normAutofit lnSpcReduction="10000"/>
+            <a:normAutofit fontScale="92500" lnSpcReduction="10000"/>
           </a:bodyPr>
           <a:lstStyle/>
           <a:p>
@@ -17695,8 +17641,26 @@
               <a:defRPr/>
             </a:pPr>
             <a:r>
+              <a:rPr lang="en-US" dirty="0"/>
+              <a:t>Module 0: Introduction to cloud </a:t>
+            </a:r>
+            <a:r>
+              <a:rPr lang="en-US" dirty="0" smtClean="0"/>
+              <a:t>computing</a:t>
+            </a:r>
+            <a:endParaRPr lang="en-US" dirty="0" smtClean="0"/>
+          </a:p>
+          <a:p>
+            <a:pPr>
+              <a:defRPr/>
+            </a:pPr>
+            <a:r>
+              <a:rPr lang="en-US" b="1" dirty="0" smtClean="0"/>
+              <a:t>Module </a:t>
+            </a:r>
+            <a:r>
               <a:rPr lang="en-US" b="1" dirty="0"/>
-              <a:t>Module 1: Introduction to RNA sequencing</a:t>
+              <a:t>1: Introduction to RNA sequencing</a:t>
             </a:r>
           </a:p>
           <a:p>
@@ -20420,7 +20384,7 @@
           <a:lstStyle/>
           <a:p>
             <a:r>
-              <a:rPr lang="en-US">
+              <a:rPr lang="en-US" dirty="0">
                 <a:latin typeface="Calibri" charset="0"/>
                 <a:ea typeface="ＭＳ Ｐゴシック" charset="0"/>
               </a:rPr>
@@ -20430,7 +20394,7 @@
           <a:p>
             <a:pPr lvl="1"/>
             <a:r>
-              <a:rPr lang="en-US">
+              <a:rPr lang="en-US" dirty="0">
                 <a:latin typeface="Calibri" charset="0"/>
                 <a:ea typeface="ＭＳ Ｐゴシック" charset="0"/>
               </a:rPr>
@@ -20440,7 +20404,7 @@
           <a:p>
             <a:pPr lvl="2"/>
             <a:r>
-              <a:rPr lang="en-US">
+              <a:rPr lang="en-US" dirty="0">
                 <a:latin typeface="Calibri" charset="0"/>
                 <a:ea typeface="ＭＳ Ｐゴシック" charset="0"/>
               </a:rPr>
@@ -20450,7 +20414,7 @@
           <a:p>
             <a:pPr lvl="2"/>
             <a:r>
-              <a:rPr lang="en-US">
+              <a:rPr lang="en-US" dirty="0">
                 <a:latin typeface="Calibri" charset="0"/>
                 <a:ea typeface="ＭＳ Ｐゴシック" charset="0"/>
               </a:rPr>
@@ -20459,41 +20423,66 @@
           </a:p>
           <a:p>
             <a:r>
-              <a:rPr lang="en-US">
-                <a:latin typeface="Calibri" charset="0"/>
-                <a:ea typeface="ＭＳ Ｐゴシック" charset="0"/>
-              </a:rPr>
-              <a:t>Some molecular features can only be observed at the RNA level</a:t>
+              <a:rPr lang="en-US" dirty="0">
+                <a:latin typeface="Calibri" charset="0"/>
+                <a:ea typeface="ＭＳ Ｐゴシック" charset="0"/>
+              </a:rPr>
+              <a:t>Predicting transcript sequence from genome sequence is </a:t>
+            </a:r>
+            <a:r>
+              <a:rPr lang="en-US" dirty="0" smtClean="0">
+                <a:latin typeface="Calibri" charset="0"/>
+                <a:ea typeface="ＭＳ Ｐゴシック" charset="0"/>
+              </a:rPr>
+              <a:t>difficult</a:t>
             </a:r>
           </a:p>
           <a:p>
             <a:pPr lvl="1"/>
             <a:r>
-              <a:rPr lang="en-US">
-                <a:latin typeface="Calibri" charset="0"/>
-                <a:ea typeface="ＭＳ Ｐゴシック" charset="0"/>
-              </a:rPr>
-              <a:t>Alternative isoforms, fusion transcripts, RNA editing</a:t>
-            </a:r>
-          </a:p>
-          <a:p>
-            <a:r>
-              <a:rPr lang="en-US">
-                <a:latin typeface="Calibri" charset="0"/>
-                <a:ea typeface="ＭＳ Ｐゴシック" charset="0"/>
-              </a:rPr>
-              <a:t>Predicting transcript sequence from genome sequence is difficult</a:t>
+              <a:rPr lang="en-US" dirty="0" smtClean="0">
+                <a:latin typeface="Calibri" charset="0"/>
+                <a:ea typeface="ＭＳ Ｐゴシック" charset="0"/>
+              </a:rPr>
+              <a:t>Gene annotation is revolutionized by RNA-seq</a:t>
+            </a:r>
+          </a:p>
+          <a:p>
+            <a:r>
+              <a:rPr lang="en-US" dirty="0" smtClean="0">
+                <a:latin typeface="Calibri" charset="0"/>
+                <a:ea typeface="ＭＳ Ｐゴシック" charset="0"/>
+              </a:rPr>
+              <a:t>Some </a:t>
+            </a:r>
+            <a:r>
+              <a:rPr lang="en-US" dirty="0">
+                <a:latin typeface="Calibri" charset="0"/>
+                <a:ea typeface="ＭＳ Ｐゴシック" charset="0"/>
+              </a:rPr>
+              <a:t>molecular features can only be observed at the RNA level</a:t>
             </a:r>
           </a:p>
           <a:p>
             <a:pPr lvl="1"/>
             <a:r>
-              <a:rPr lang="en-US">
-                <a:latin typeface="Calibri" charset="0"/>
-                <a:ea typeface="ＭＳ Ｐゴシック" charset="0"/>
-              </a:rPr>
-              <a:t>Alternative splicing, RNA editing, etc.</a:t>
-            </a:r>
+              <a:rPr lang="en-US" dirty="0">
+                <a:latin typeface="Calibri" charset="0"/>
+                <a:ea typeface="ＭＳ Ｐゴシック" charset="0"/>
+              </a:rPr>
+              <a:t>Alternative isoforms, fusion transcripts, RNA </a:t>
+            </a:r>
+            <a:r>
+              <a:rPr lang="en-US" dirty="0" smtClean="0">
+                <a:latin typeface="Calibri" charset="0"/>
+                <a:ea typeface="ＭＳ Ｐゴシック" charset="0"/>
+              </a:rPr>
+              <a:t>editing</a:t>
+            </a:r>
+            <a:endParaRPr lang="en-US" dirty="0">
+              <a:latin typeface="Calibri" charset="0"/>
+              <a:ea typeface="ＭＳ Ｐゴシック" charset="0"/>
+            </a:endParaRPr>
           </a:p>
         </p:txBody>
       </p:sp>

</xml_diff>